<commit_message>
Added a prototype doalogue system in scene3. Uses a Fedora Linux terminal as the backdrop for the text.
</commit_message>
<xml_diff>
--- a/ProjectFolder/Sideways/Assets/Pics/sprite designs.pptx
+++ b/ProjectFolder/Sideways/Assets/Pics/sprite designs.pptx
@@ -8,6 +8,7 @@
     <p:sldId id="256" r:id="rId2"/>
     <p:sldId id="257" r:id="rId3"/>
     <p:sldId id="258" r:id="rId4"/>
+    <p:sldId id="259" r:id="rId5"/>
   </p:sldIdLst>
   <p:sldSz cx="12192000" cy="6858000"/>
   <p:notesSz cx="6858000" cy="9144000"/>
@@ -261,7 +262,7 @@
           <a:p>
             <a:fld id="{C1ECD762-9F41-48F3-8A19-76C2870CFF4B}" type="datetimeFigureOut">
               <a:rPr lang="en-US" smtClean="0"/>
-              <a:t>7/8/2018</a:t>
+              <a:t>11/4/2018</a:t>
             </a:fld>
             <a:endParaRPr lang="en-US"/>
           </a:p>
@@ -459,7 +460,7 @@
           <a:p>
             <a:fld id="{C1ECD762-9F41-48F3-8A19-76C2870CFF4B}" type="datetimeFigureOut">
               <a:rPr lang="en-US" smtClean="0"/>
-              <a:t>7/8/2018</a:t>
+              <a:t>11/4/2018</a:t>
             </a:fld>
             <a:endParaRPr lang="en-US"/>
           </a:p>
@@ -667,7 +668,7 @@
           <a:p>
             <a:fld id="{C1ECD762-9F41-48F3-8A19-76C2870CFF4B}" type="datetimeFigureOut">
               <a:rPr lang="en-US" smtClean="0"/>
-              <a:t>7/8/2018</a:t>
+              <a:t>11/4/2018</a:t>
             </a:fld>
             <a:endParaRPr lang="en-US"/>
           </a:p>
@@ -865,7 +866,7 @@
           <a:p>
             <a:fld id="{C1ECD762-9F41-48F3-8A19-76C2870CFF4B}" type="datetimeFigureOut">
               <a:rPr lang="en-US" smtClean="0"/>
-              <a:t>7/8/2018</a:t>
+              <a:t>11/4/2018</a:t>
             </a:fld>
             <a:endParaRPr lang="en-US"/>
           </a:p>
@@ -1140,7 +1141,7 @@
           <a:p>
             <a:fld id="{C1ECD762-9F41-48F3-8A19-76C2870CFF4B}" type="datetimeFigureOut">
               <a:rPr lang="en-US" smtClean="0"/>
-              <a:t>7/8/2018</a:t>
+              <a:t>11/4/2018</a:t>
             </a:fld>
             <a:endParaRPr lang="en-US"/>
           </a:p>
@@ -1405,7 +1406,7 @@
           <a:p>
             <a:fld id="{C1ECD762-9F41-48F3-8A19-76C2870CFF4B}" type="datetimeFigureOut">
               <a:rPr lang="en-US" smtClean="0"/>
-              <a:t>7/8/2018</a:t>
+              <a:t>11/4/2018</a:t>
             </a:fld>
             <a:endParaRPr lang="en-US"/>
           </a:p>
@@ -1817,7 +1818,7 @@
           <a:p>
             <a:fld id="{C1ECD762-9F41-48F3-8A19-76C2870CFF4B}" type="datetimeFigureOut">
               <a:rPr lang="en-US" smtClean="0"/>
-              <a:t>7/8/2018</a:t>
+              <a:t>11/4/2018</a:t>
             </a:fld>
             <a:endParaRPr lang="en-US"/>
           </a:p>
@@ -1958,7 +1959,7 @@
           <a:p>
             <a:fld id="{C1ECD762-9F41-48F3-8A19-76C2870CFF4B}" type="datetimeFigureOut">
               <a:rPr lang="en-US" smtClean="0"/>
-              <a:t>7/8/2018</a:t>
+              <a:t>11/4/2018</a:t>
             </a:fld>
             <a:endParaRPr lang="en-US"/>
           </a:p>
@@ -2071,7 +2072,7 @@
           <a:p>
             <a:fld id="{C1ECD762-9F41-48F3-8A19-76C2870CFF4B}" type="datetimeFigureOut">
               <a:rPr lang="en-US" smtClean="0"/>
-              <a:t>7/8/2018</a:t>
+              <a:t>11/4/2018</a:t>
             </a:fld>
             <a:endParaRPr lang="en-US"/>
           </a:p>
@@ -2382,7 +2383,7 @@
           <a:p>
             <a:fld id="{C1ECD762-9F41-48F3-8A19-76C2870CFF4B}" type="datetimeFigureOut">
               <a:rPr lang="en-US" smtClean="0"/>
-              <a:t>7/8/2018</a:t>
+              <a:t>11/4/2018</a:t>
             </a:fld>
             <a:endParaRPr lang="en-US"/>
           </a:p>
@@ -2670,7 +2671,7 @@
           <a:p>
             <a:fld id="{C1ECD762-9F41-48F3-8A19-76C2870CFF4B}" type="datetimeFigureOut">
               <a:rPr lang="en-US" smtClean="0"/>
-              <a:t>7/8/2018</a:t>
+              <a:t>11/4/2018</a:t>
             </a:fld>
             <a:endParaRPr lang="en-US"/>
           </a:p>
@@ -2911,7 +2912,7 @@
           <a:p>
             <a:fld id="{C1ECD762-9F41-48F3-8A19-76C2870CFF4B}" type="datetimeFigureOut">
               <a:rPr lang="en-US" smtClean="0"/>
-              <a:t>7/8/2018</a:t>
+              <a:t>11/4/2018</a:t>
             </a:fld>
             <a:endParaRPr lang="en-US"/>
           </a:p>
@@ -6542,6 +6543,592 @@
 </p:sld>
 </file>
 
+<file path=ppt/slides/slide4.xml><?xml version="1.0" encoding="utf-8"?>
+<p:sld xmlns:a="http://schemas.openxmlformats.org/drawingml/2006/main" xmlns:r="http://schemas.openxmlformats.org/officeDocument/2006/relationships" xmlns:p="http://schemas.openxmlformats.org/presentationml/2006/main">
+  <p:cSld>
+    <p:bg>
+      <p:bgPr>
+        <a:solidFill>
+          <a:srgbClr val="33CC33"/>
+        </a:solidFill>
+        <a:effectLst/>
+      </p:bgPr>
+    </p:bg>
+    <p:spTree>
+      <p:nvGrpSpPr>
+        <p:cNvPr id="1" name=""/>
+        <p:cNvGrpSpPr/>
+        <p:nvPr/>
+      </p:nvGrpSpPr>
+      <p:grpSpPr>
+        <a:xfrm>
+          <a:off x="0" y="0"/>
+          <a:ext cx="0" cy="0"/>
+          <a:chOff x="0" y="0"/>
+          <a:chExt cx="0" cy="0"/>
+        </a:xfrm>
+      </p:grpSpPr>
+      <p:sp>
+        <p:nvSpPr>
+          <p:cNvPr id="5" name="Rectangle 4">
+            <a:extLst>
+              <a:ext uri="{FF2B5EF4-FFF2-40B4-BE49-F238E27FC236}">
+                <a16:creationId xmlns:a16="http://schemas.microsoft.com/office/drawing/2014/main" id="{1416BB9F-4C41-4E90-9EC9-7B65E45F12BC}"/>
+              </a:ext>
+            </a:extLst>
+          </p:cNvPr>
+          <p:cNvSpPr/>
+          <p:nvPr/>
+        </p:nvSpPr>
+        <p:spPr>
+          <a:xfrm>
+            <a:off x="3329795" y="2424023"/>
+            <a:ext cx="4666891" cy="1423358"/>
+          </a:xfrm>
+          <a:prstGeom prst="rect">
+            <a:avLst/>
+          </a:prstGeom>
+          <a:solidFill>
+            <a:schemeClr val="bg1"/>
+          </a:solidFill>
+          <a:ln w="19050">
+            <a:solidFill>
+              <a:schemeClr val="bg1">
+                <a:lumMod val="85000"/>
+              </a:schemeClr>
+            </a:solidFill>
+          </a:ln>
+        </p:spPr>
+        <p:style>
+          <a:lnRef idx="2">
+            <a:schemeClr val="accent1">
+              <a:shade val="50000"/>
+            </a:schemeClr>
+          </a:lnRef>
+          <a:fillRef idx="1">
+            <a:schemeClr val="accent1"/>
+          </a:fillRef>
+          <a:effectRef idx="0">
+            <a:schemeClr val="accent1"/>
+          </a:effectRef>
+          <a:fontRef idx="minor">
+            <a:schemeClr val="lt1"/>
+          </a:fontRef>
+        </p:style>
+        <p:txBody>
+          <a:bodyPr rtlCol="0" anchor="ctr"/>
+          <a:lstStyle/>
+          <a:p>
+            <a:pPr algn="ctr"/>
+            <a:endParaRPr lang="en-US"/>
+          </a:p>
+        </p:txBody>
+      </p:sp>
+      <p:sp>
+        <p:nvSpPr>
+          <p:cNvPr id="7" name="Rectangle 6">
+            <a:extLst>
+              <a:ext uri="{FF2B5EF4-FFF2-40B4-BE49-F238E27FC236}">
+                <a16:creationId xmlns:a16="http://schemas.microsoft.com/office/drawing/2014/main" id="{6B2B3C88-E74C-46A2-8BC1-50A38024B422}"/>
+              </a:ext>
+            </a:extLst>
+          </p:cNvPr>
+          <p:cNvSpPr/>
+          <p:nvPr/>
+        </p:nvSpPr>
+        <p:spPr>
+          <a:xfrm>
+            <a:off x="3329795" y="2262188"/>
+            <a:ext cx="4666891" cy="161835"/>
+          </a:xfrm>
+          <a:prstGeom prst="rect">
+            <a:avLst/>
+          </a:prstGeom>
+          <a:gradFill flip="none" rotWithShape="1">
+            <a:gsLst>
+              <a:gs pos="35000">
+                <a:schemeClr val="bg1">
+                  <a:lumMod val="85000"/>
+                </a:schemeClr>
+              </a:gs>
+              <a:gs pos="77000">
+                <a:schemeClr val="bg1">
+                  <a:lumMod val="95000"/>
+                </a:schemeClr>
+              </a:gs>
+            </a:gsLst>
+            <a:lin ang="16200000" scaled="1"/>
+            <a:tileRect/>
+          </a:gradFill>
+          <a:ln w="19050">
+            <a:solidFill>
+              <a:schemeClr val="bg1">
+                <a:lumMod val="85000"/>
+              </a:schemeClr>
+            </a:solidFill>
+          </a:ln>
+        </p:spPr>
+        <p:style>
+          <a:lnRef idx="2">
+            <a:schemeClr val="accent1">
+              <a:shade val="50000"/>
+            </a:schemeClr>
+          </a:lnRef>
+          <a:fillRef idx="1">
+            <a:schemeClr val="accent1"/>
+          </a:fillRef>
+          <a:effectRef idx="0">
+            <a:schemeClr val="accent1"/>
+          </a:effectRef>
+          <a:fontRef idx="minor">
+            <a:schemeClr val="lt1"/>
+          </a:fontRef>
+        </p:style>
+        <p:txBody>
+          <a:bodyPr rtlCol="0" anchor="ctr"/>
+          <a:lstStyle/>
+          <a:p>
+            <a:r>
+              <a:rPr lang="en-US" sz="1100" dirty="0">
+                <a:solidFill>
+                  <a:schemeClr val="tx1"/>
+                </a:solidFill>
+              </a:rPr>
+              <a:t>File     Edit     View     Terminal     Help</a:t>
+            </a:r>
+            <a:endParaRPr lang="en-US" dirty="0">
+              <a:solidFill>
+                <a:schemeClr val="tx1"/>
+              </a:solidFill>
+            </a:endParaRPr>
+          </a:p>
+        </p:txBody>
+      </p:sp>
+      <p:sp>
+        <p:nvSpPr>
+          <p:cNvPr id="8" name="Rectangle: Top Corners Rounded 7">
+            <a:extLst>
+              <a:ext uri="{FF2B5EF4-FFF2-40B4-BE49-F238E27FC236}">
+                <a16:creationId xmlns:a16="http://schemas.microsoft.com/office/drawing/2014/main" id="{AEB22799-E7E4-47C6-8FAD-39B51EEE76B2}"/>
+              </a:ext>
+            </a:extLst>
+          </p:cNvPr>
+          <p:cNvSpPr/>
+          <p:nvPr/>
+        </p:nvSpPr>
+        <p:spPr>
+          <a:xfrm>
+            <a:off x="3317484" y="2100354"/>
+            <a:ext cx="4691107" cy="161834"/>
+          </a:xfrm>
+          <a:prstGeom prst="round2SameRect">
+            <a:avLst>
+              <a:gd name="adj1" fmla="val 41682"/>
+              <a:gd name="adj2" fmla="val 0"/>
+            </a:avLst>
+          </a:prstGeom>
+          <a:gradFill flip="none" rotWithShape="1">
+            <a:gsLst>
+              <a:gs pos="57000">
+                <a:schemeClr val="accent1">
+                  <a:tint val="66000"/>
+                  <a:satMod val="160000"/>
+                  <a:lumMod val="92000"/>
+                </a:schemeClr>
+              </a:gs>
+              <a:gs pos="100000">
+                <a:schemeClr val="accent1">
+                  <a:tint val="44500"/>
+                  <a:satMod val="160000"/>
+                </a:schemeClr>
+              </a:gs>
+            </a:gsLst>
+            <a:lin ang="16200000" scaled="1"/>
+            <a:tileRect/>
+          </a:gradFill>
+          <a:ln>
+            <a:noFill/>
+          </a:ln>
+        </p:spPr>
+        <p:style>
+          <a:lnRef idx="2">
+            <a:schemeClr val="accent1">
+              <a:shade val="50000"/>
+            </a:schemeClr>
+          </a:lnRef>
+          <a:fillRef idx="1">
+            <a:schemeClr val="accent1"/>
+          </a:fillRef>
+          <a:effectRef idx="0">
+            <a:schemeClr val="accent1"/>
+          </a:effectRef>
+          <a:fontRef idx="minor">
+            <a:schemeClr val="lt1"/>
+          </a:fontRef>
+        </p:style>
+        <p:txBody>
+          <a:bodyPr rtlCol="0" anchor="ctr"/>
+          <a:lstStyle/>
+          <a:p>
+            <a:pPr algn="ctr"/>
+            <a:endParaRPr lang="en-US"/>
+          </a:p>
+        </p:txBody>
+      </p:sp>
+      <p:sp>
+        <p:nvSpPr>
+          <p:cNvPr id="9" name="Rectangle: Rounded Corners 8">
+            <a:extLst>
+              <a:ext uri="{FF2B5EF4-FFF2-40B4-BE49-F238E27FC236}">
+                <a16:creationId xmlns:a16="http://schemas.microsoft.com/office/drawing/2014/main" id="{885936E8-B768-492B-B51D-B1C0C616496D}"/>
+              </a:ext>
+            </a:extLst>
+          </p:cNvPr>
+          <p:cNvSpPr/>
+          <p:nvPr/>
+        </p:nvSpPr>
+        <p:spPr>
+          <a:xfrm>
+            <a:off x="7848600" y="2125754"/>
+            <a:ext cx="114300" cy="109446"/>
+          </a:xfrm>
+          <a:prstGeom prst="roundRect">
+            <a:avLst/>
+          </a:prstGeom>
+          <a:noFill/>
+          <a:ln>
+            <a:solidFill>
+              <a:schemeClr val="accent1"/>
+            </a:solidFill>
+          </a:ln>
+        </p:spPr>
+        <p:style>
+          <a:lnRef idx="2">
+            <a:schemeClr val="accent1">
+              <a:shade val="50000"/>
+            </a:schemeClr>
+          </a:lnRef>
+          <a:fillRef idx="1">
+            <a:schemeClr val="accent1"/>
+          </a:fillRef>
+          <a:effectRef idx="0">
+            <a:schemeClr val="accent1"/>
+          </a:effectRef>
+          <a:fontRef idx="minor">
+            <a:schemeClr val="lt1"/>
+          </a:fontRef>
+        </p:style>
+        <p:txBody>
+          <a:bodyPr rtlCol="0" anchor="ctr"/>
+          <a:lstStyle/>
+          <a:p>
+            <a:pPr algn="ctr"/>
+            <a:r>
+              <a:rPr lang="en-US" sz="1050" dirty="0"/>
+              <a:t>x</a:t>
+            </a:r>
+          </a:p>
+        </p:txBody>
+      </p:sp>
+      <p:sp>
+        <p:nvSpPr>
+          <p:cNvPr id="10" name="Rectangle: Rounded Corners 9">
+            <a:extLst>
+              <a:ext uri="{FF2B5EF4-FFF2-40B4-BE49-F238E27FC236}">
+                <a16:creationId xmlns:a16="http://schemas.microsoft.com/office/drawing/2014/main" id="{646F25EE-A52C-4B52-8B2E-73FC34FFC815}"/>
+              </a:ext>
+            </a:extLst>
+          </p:cNvPr>
+          <p:cNvSpPr/>
+          <p:nvPr/>
+        </p:nvSpPr>
+        <p:spPr>
+          <a:xfrm>
+            <a:off x="7688609" y="2125754"/>
+            <a:ext cx="114300" cy="109446"/>
+          </a:xfrm>
+          <a:prstGeom prst="roundRect">
+            <a:avLst/>
+          </a:prstGeom>
+          <a:noFill/>
+          <a:ln>
+            <a:solidFill>
+              <a:schemeClr val="accent1"/>
+            </a:solidFill>
+          </a:ln>
+        </p:spPr>
+        <p:style>
+          <a:lnRef idx="2">
+            <a:schemeClr val="accent1">
+              <a:shade val="50000"/>
+            </a:schemeClr>
+          </a:lnRef>
+          <a:fillRef idx="1">
+            <a:schemeClr val="accent1"/>
+          </a:fillRef>
+          <a:effectRef idx="0">
+            <a:schemeClr val="accent1"/>
+          </a:effectRef>
+          <a:fontRef idx="minor">
+            <a:schemeClr val="lt1"/>
+          </a:fontRef>
+        </p:style>
+        <p:txBody>
+          <a:bodyPr rtlCol="0" anchor="ctr"/>
+          <a:lstStyle/>
+          <a:p>
+            <a:pPr algn="ctr"/>
+            <a:endParaRPr lang="en-US"/>
+          </a:p>
+        </p:txBody>
+      </p:sp>
+      <p:sp>
+        <p:nvSpPr>
+          <p:cNvPr id="11" name="Rectangle: Rounded Corners 10">
+            <a:extLst>
+              <a:ext uri="{FF2B5EF4-FFF2-40B4-BE49-F238E27FC236}">
+                <a16:creationId xmlns:a16="http://schemas.microsoft.com/office/drawing/2014/main" id="{36513F81-0B75-4089-8388-170821F90C2E}"/>
+              </a:ext>
+            </a:extLst>
+          </p:cNvPr>
+          <p:cNvSpPr/>
+          <p:nvPr/>
+        </p:nvSpPr>
+        <p:spPr>
+          <a:xfrm>
+            <a:off x="7528618" y="2125754"/>
+            <a:ext cx="114300" cy="109446"/>
+          </a:xfrm>
+          <a:prstGeom prst="roundRect">
+            <a:avLst/>
+          </a:prstGeom>
+          <a:noFill/>
+          <a:ln>
+            <a:solidFill>
+              <a:schemeClr val="accent1"/>
+            </a:solidFill>
+          </a:ln>
+        </p:spPr>
+        <p:style>
+          <a:lnRef idx="2">
+            <a:schemeClr val="accent1">
+              <a:shade val="50000"/>
+            </a:schemeClr>
+          </a:lnRef>
+          <a:fillRef idx="1">
+            <a:schemeClr val="accent1"/>
+          </a:fillRef>
+          <a:effectRef idx="0">
+            <a:schemeClr val="accent1"/>
+          </a:effectRef>
+          <a:fontRef idx="minor">
+            <a:schemeClr val="lt1"/>
+          </a:fontRef>
+        </p:style>
+        <p:txBody>
+          <a:bodyPr rtlCol="0" anchor="ctr"/>
+          <a:lstStyle/>
+          <a:p>
+            <a:pPr algn="ctr"/>
+            <a:r>
+              <a:rPr lang="en-US" dirty="0"/>
+              <a:t>-</a:t>
+            </a:r>
+          </a:p>
+        </p:txBody>
+      </p:sp>
+      <p:sp>
+        <p:nvSpPr>
+          <p:cNvPr id="12" name="Rectangle 11">
+            <a:extLst>
+              <a:ext uri="{FF2B5EF4-FFF2-40B4-BE49-F238E27FC236}">
+                <a16:creationId xmlns:a16="http://schemas.microsoft.com/office/drawing/2014/main" id="{2D61B462-EA92-4441-B155-9DE3C1E2399F}"/>
+              </a:ext>
+            </a:extLst>
+          </p:cNvPr>
+          <p:cNvSpPr/>
+          <p:nvPr/>
+        </p:nvSpPr>
+        <p:spPr>
+          <a:xfrm>
+            <a:off x="7713613" y="2164556"/>
+            <a:ext cx="58787" cy="52387"/>
+          </a:xfrm>
+          <a:prstGeom prst="rect">
+            <a:avLst/>
+          </a:prstGeom>
+          <a:noFill/>
+          <a:ln>
+            <a:gradFill flip="none" rotWithShape="1">
+              <a:gsLst>
+                <a:gs pos="0">
+                  <a:schemeClr val="accent1">
+                    <a:lumMod val="5000"/>
+                    <a:lumOff val="95000"/>
+                  </a:schemeClr>
+                </a:gs>
+                <a:gs pos="74000">
+                  <a:schemeClr val="accent1">
+                    <a:lumMod val="45000"/>
+                    <a:lumOff val="55000"/>
+                  </a:schemeClr>
+                </a:gs>
+                <a:gs pos="83000">
+                  <a:schemeClr val="accent1">
+                    <a:lumMod val="45000"/>
+                    <a:lumOff val="55000"/>
+                  </a:schemeClr>
+                </a:gs>
+                <a:gs pos="100000">
+                  <a:schemeClr val="accent1">
+                    <a:lumMod val="30000"/>
+                    <a:lumOff val="70000"/>
+                  </a:schemeClr>
+                </a:gs>
+              </a:gsLst>
+              <a:lin ang="8100000" scaled="1"/>
+              <a:tileRect/>
+            </a:gradFill>
+          </a:ln>
+        </p:spPr>
+        <p:style>
+          <a:lnRef idx="2">
+            <a:schemeClr val="accent1">
+              <a:shade val="50000"/>
+            </a:schemeClr>
+          </a:lnRef>
+          <a:fillRef idx="1">
+            <a:schemeClr val="accent1"/>
+          </a:fillRef>
+          <a:effectRef idx="0">
+            <a:schemeClr val="accent1"/>
+          </a:effectRef>
+          <a:fontRef idx="minor">
+            <a:schemeClr val="lt1"/>
+          </a:fontRef>
+        </p:style>
+        <p:txBody>
+          <a:bodyPr rtlCol="0" anchor="ctr"/>
+          <a:lstStyle/>
+          <a:p>
+            <a:pPr algn="ctr"/>
+            <a:endParaRPr lang="en-US"/>
+          </a:p>
+        </p:txBody>
+      </p:sp>
+      <p:sp>
+        <p:nvSpPr>
+          <p:cNvPr id="13" name="Rectangle 12">
+            <a:extLst>
+              <a:ext uri="{FF2B5EF4-FFF2-40B4-BE49-F238E27FC236}">
+                <a16:creationId xmlns:a16="http://schemas.microsoft.com/office/drawing/2014/main" id="{1C24DD20-EB2A-44E7-A12A-2DC3F3CB92FB}"/>
+              </a:ext>
+            </a:extLst>
+          </p:cNvPr>
+          <p:cNvSpPr/>
+          <p:nvPr/>
+        </p:nvSpPr>
+        <p:spPr>
+          <a:xfrm>
+            <a:off x="3355496" y="2122555"/>
+            <a:ext cx="114300" cy="109446"/>
+          </a:xfrm>
+          <a:prstGeom prst="rect">
+            <a:avLst/>
+          </a:prstGeom>
+          <a:solidFill>
+            <a:schemeClr val="tx1"/>
+          </a:solidFill>
+          <a:ln>
+            <a:solidFill>
+              <a:schemeClr val="bg1">
+                <a:lumMod val="75000"/>
+              </a:schemeClr>
+            </a:solidFill>
+          </a:ln>
+        </p:spPr>
+        <p:style>
+          <a:lnRef idx="2">
+            <a:schemeClr val="accent1">
+              <a:shade val="50000"/>
+            </a:schemeClr>
+          </a:lnRef>
+          <a:fillRef idx="1">
+            <a:schemeClr val="accent1"/>
+          </a:fillRef>
+          <a:effectRef idx="0">
+            <a:schemeClr val="accent1"/>
+          </a:effectRef>
+          <a:fontRef idx="minor">
+            <a:schemeClr val="lt1"/>
+          </a:fontRef>
+        </p:style>
+        <p:txBody>
+          <a:bodyPr rtlCol="0" anchor="ctr"/>
+          <a:lstStyle/>
+          <a:p>
+            <a:pPr algn="ctr"/>
+            <a:endParaRPr lang="en-US"/>
+          </a:p>
+        </p:txBody>
+      </p:sp>
+      <p:sp>
+        <p:nvSpPr>
+          <p:cNvPr id="14" name="TextBox 13">
+            <a:extLst>
+              <a:ext uri="{FF2B5EF4-FFF2-40B4-BE49-F238E27FC236}">
+                <a16:creationId xmlns:a16="http://schemas.microsoft.com/office/drawing/2014/main" id="{688ACF76-DF56-431C-A366-58F14BEBE3C1}"/>
+              </a:ext>
+            </a:extLst>
+          </p:cNvPr>
+          <p:cNvSpPr txBox="1"/>
+          <p:nvPr/>
+        </p:nvSpPr>
+        <p:spPr>
+          <a:xfrm>
+            <a:off x="3281841" y="2084945"/>
+            <a:ext cx="261610" cy="184666"/>
+          </a:xfrm>
+          <a:prstGeom prst="rect">
+            <a:avLst/>
+          </a:prstGeom>
+          <a:noFill/>
+        </p:spPr>
+        <p:txBody>
+          <a:bodyPr wrap="none" rtlCol="0">
+            <a:spAutoFit/>
+          </a:bodyPr>
+          <a:lstStyle/>
+          <a:p>
+            <a:r>
+              <a:rPr lang="en-US" sz="600" dirty="0">
+                <a:solidFill>
+                  <a:schemeClr val="bg1"/>
+                </a:solidFill>
+              </a:rPr>
+              <a:t>&gt;_</a:t>
+            </a:r>
+            <a:endParaRPr lang="en-US" dirty="0">
+              <a:solidFill>
+                <a:schemeClr val="bg1"/>
+              </a:solidFill>
+            </a:endParaRPr>
+          </a:p>
+        </p:txBody>
+      </p:sp>
+    </p:spTree>
+    <p:extLst>
+      <p:ext uri="{BB962C8B-B14F-4D97-AF65-F5344CB8AC3E}">
+        <p14:creationId xmlns:p14="http://schemas.microsoft.com/office/powerpoint/2010/main" val="891263525"/>
+      </p:ext>
+    </p:extLst>
+  </p:cSld>
+  <p:clrMapOvr>
+    <a:masterClrMapping/>
+  </p:clrMapOvr>
+</p:sld>
+</file>
+
 <file path=ppt/theme/theme1.xml><?xml version="1.0" encoding="utf-8"?>
 <a:theme xmlns:a="http://schemas.openxmlformats.org/drawingml/2006/main" name="Office Theme">
   <a:themeElements>

</xml_diff>